<commit_message>
Update ppt, falta terminar demo
</commit_message>
<xml_diff>
--- a/trabajo/ppt/Servidores web de altas prestaciones en entornos virtualizados.pptx
+++ b/trabajo/ppt/Servidores web de altas prestaciones en entornos virtualizados.pptx
@@ -9,8 +9,8 @@
     <p:sldId id="257" r:id="rId3"/>
     <p:sldId id="258" r:id="rId4"/>
     <p:sldId id="259" r:id="rId5"/>
-    <p:sldId id="260" r:id="rId6"/>
-    <p:sldId id="264" r:id="rId7"/>
+    <p:sldId id="264" r:id="rId6"/>
+    <p:sldId id="260" r:id="rId7"/>
     <p:sldId id="265" r:id="rId8"/>
     <p:sldId id="266" r:id="rId9"/>
     <p:sldId id="267" r:id="rId10"/>
@@ -300,7 +300,7 @@
           <a:p>
             <a:fld id="{6519E9D0-2B62-4606-BBEB-1C22B968E8ED}" type="datetimeFigureOut">
               <a:rPr lang="es-ES" smtClean="0"/>
-              <a:t>04/05/2018</a:t>
+              <a:t>06/05/2018</a:t>
             </a:fld>
             <a:endParaRPr lang="es-ES"/>
           </a:p>
@@ -470,7 +470,7 @@
           <a:p>
             <a:fld id="{6519E9D0-2B62-4606-BBEB-1C22B968E8ED}" type="datetimeFigureOut">
               <a:rPr lang="es-ES" smtClean="0"/>
-              <a:t>04/05/2018</a:t>
+              <a:t>06/05/2018</a:t>
             </a:fld>
             <a:endParaRPr lang="es-ES"/>
           </a:p>
@@ -650,7 +650,7 @@
           <a:p>
             <a:fld id="{6519E9D0-2B62-4606-BBEB-1C22B968E8ED}" type="datetimeFigureOut">
               <a:rPr lang="es-ES" smtClean="0"/>
-              <a:t>04/05/2018</a:t>
+              <a:t>06/05/2018</a:t>
             </a:fld>
             <a:endParaRPr lang="es-ES"/>
           </a:p>
@@ -820,7 +820,7 @@
           <a:p>
             <a:fld id="{6519E9D0-2B62-4606-BBEB-1C22B968E8ED}" type="datetimeFigureOut">
               <a:rPr lang="es-ES" smtClean="0"/>
-              <a:t>04/05/2018</a:t>
+              <a:t>06/05/2018</a:t>
             </a:fld>
             <a:endParaRPr lang="es-ES"/>
           </a:p>
@@ -1066,7 +1066,7 @@
           <a:p>
             <a:fld id="{6519E9D0-2B62-4606-BBEB-1C22B968E8ED}" type="datetimeFigureOut">
               <a:rPr lang="es-ES" smtClean="0"/>
-              <a:t>04/05/2018</a:t>
+              <a:t>06/05/2018</a:t>
             </a:fld>
             <a:endParaRPr lang="es-ES"/>
           </a:p>
@@ -1354,7 +1354,7 @@
           <a:p>
             <a:fld id="{6519E9D0-2B62-4606-BBEB-1C22B968E8ED}" type="datetimeFigureOut">
               <a:rPr lang="es-ES" smtClean="0"/>
-              <a:t>04/05/2018</a:t>
+              <a:t>06/05/2018</a:t>
             </a:fld>
             <a:endParaRPr lang="es-ES"/>
           </a:p>
@@ -1776,7 +1776,7 @@
           <a:p>
             <a:fld id="{6519E9D0-2B62-4606-BBEB-1C22B968E8ED}" type="datetimeFigureOut">
               <a:rPr lang="es-ES" smtClean="0"/>
-              <a:t>04/05/2018</a:t>
+              <a:t>06/05/2018</a:t>
             </a:fld>
             <a:endParaRPr lang="es-ES"/>
           </a:p>
@@ -1894,7 +1894,7 @@
           <a:p>
             <a:fld id="{6519E9D0-2B62-4606-BBEB-1C22B968E8ED}" type="datetimeFigureOut">
               <a:rPr lang="es-ES" smtClean="0"/>
-              <a:t>04/05/2018</a:t>
+              <a:t>06/05/2018</a:t>
             </a:fld>
             <a:endParaRPr lang="es-ES"/>
           </a:p>
@@ -1989,7 +1989,7 @@
           <a:p>
             <a:fld id="{6519E9D0-2B62-4606-BBEB-1C22B968E8ED}" type="datetimeFigureOut">
               <a:rPr lang="es-ES" smtClean="0"/>
-              <a:t>04/05/2018</a:t>
+              <a:t>06/05/2018</a:t>
             </a:fld>
             <a:endParaRPr lang="es-ES"/>
           </a:p>
@@ -2266,7 +2266,7 @@
           <a:p>
             <a:fld id="{6519E9D0-2B62-4606-BBEB-1C22B968E8ED}" type="datetimeFigureOut">
               <a:rPr lang="es-ES" smtClean="0"/>
-              <a:t>04/05/2018</a:t>
+              <a:t>06/05/2018</a:t>
             </a:fld>
             <a:endParaRPr lang="es-ES"/>
           </a:p>
@@ -2519,7 +2519,7 @@
           <a:p>
             <a:fld id="{6519E9D0-2B62-4606-BBEB-1C22B968E8ED}" type="datetimeFigureOut">
               <a:rPr lang="es-ES" smtClean="0"/>
-              <a:t>04/05/2018</a:t>
+              <a:t>06/05/2018</a:t>
             </a:fld>
             <a:endParaRPr lang="es-ES"/>
           </a:p>
@@ -2742,7 +2742,7 @@
           <a:p>
             <a:fld id="{6519E9D0-2B62-4606-BBEB-1C22B968E8ED}" type="datetimeFigureOut">
               <a:rPr lang="es-ES" smtClean="0"/>
-              <a:t>04/05/2018</a:t>
+              <a:t>06/05/2018</a:t>
             </a:fld>
             <a:endParaRPr lang="es-ES"/>
           </a:p>
@@ -3967,46 +3967,315 @@
       </p:grpSpPr>
       <p:sp>
         <p:nvSpPr>
-          <p:cNvPr id="2" name="1 Título"/>
-          <p:cNvSpPr>
-            <a:spLocks noGrp="1"/>
-          </p:cNvSpPr>
-          <p:nvPr>
-            <p:ph type="ctrTitle"/>
-          </p:nvPr>
-        </p:nvSpPr>
-        <p:spPr/>
-        <p:txBody>
-          <a:bodyPr/>
-          <a:lstStyle/>
-          <a:p>
-            <a:endParaRPr lang="es-ES"/>
-          </a:p>
-        </p:txBody>
-      </p:sp>
-      <p:sp>
-        <p:nvSpPr>
-          <p:cNvPr id="3" name="2 Subtítulo"/>
-          <p:cNvSpPr>
-            <a:spLocks noGrp="1"/>
-          </p:cNvSpPr>
-          <p:nvPr>
-            <p:ph type="subTitle" idx="1"/>
-          </p:nvPr>
-        </p:nvSpPr>
-        <p:spPr/>
-        <p:txBody>
-          <a:bodyPr/>
-          <a:lstStyle/>
-          <a:p>
+          <p:cNvPr id="5" name="4 Marcador de texto"/>
+          <p:cNvSpPr>
+            <a:spLocks noGrp="1"/>
+          </p:cNvSpPr>
+          <p:nvPr>
+            <p:ph type="body" idx="1"/>
+          </p:nvPr>
+        </p:nvSpPr>
+        <p:spPr>
+          <a:xfrm>
+            <a:off x="395536" y="332656"/>
+            <a:ext cx="4040188" cy="639762"/>
+          </a:xfrm>
+        </p:spPr>
+        <p:txBody>
+          <a:bodyPr/>
+          <a:lstStyle/>
+          <a:p>
+            <a:pPr algn="ctr"/>
+            <a:r>
+              <a:rPr lang="es-ES" dirty="0" smtClean="0"/>
+              <a:t>Ventajas</a:t>
+            </a:r>
             <a:endParaRPr lang="es-ES" dirty="0"/>
+          </a:p>
+        </p:txBody>
+      </p:sp>
+      <p:sp>
+        <p:nvSpPr>
+          <p:cNvPr id="6" name="5 Marcador de contenido"/>
+          <p:cNvSpPr>
+            <a:spLocks noGrp="1"/>
+          </p:cNvSpPr>
+          <p:nvPr>
+            <p:ph sz="half" idx="2"/>
+          </p:nvPr>
+        </p:nvSpPr>
+        <p:spPr>
+          <a:xfrm>
+            <a:off x="395536" y="1124744"/>
+            <a:ext cx="4032448" cy="5001419"/>
+          </a:xfrm>
+        </p:spPr>
+        <p:txBody>
+          <a:bodyPr>
+            <a:normAutofit/>
+          </a:bodyPr>
+          <a:lstStyle/>
+          <a:p>
+            <a:pPr algn="just"/>
+            <a:r>
+              <a:rPr lang="es-ES" sz="1600" b="1" dirty="0"/>
+              <a:t>Seguridad:</a:t>
+            </a:r>
+            <a:r>
+              <a:rPr lang="es-ES" sz="1600" dirty="0"/>
+              <a:t> cada máquina</a:t>
+            </a:r>
+            <a:r>
+              <a:rPr lang="es-ES" sz="1600" b="1" dirty="0"/>
+              <a:t> tiene un acceso </a:t>
+            </a:r>
+            <a:r>
+              <a:rPr lang="es-ES" sz="1600" b="1" dirty="0" smtClean="0"/>
+              <a:t>privilegiado</a:t>
+            </a:r>
+            <a:r>
+              <a:rPr lang="es-ES" sz="1600" dirty="0" smtClean="0"/>
+              <a:t> independiente.</a:t>
+            </a:r>
+          </a:p>
+          <a:p>
+            <a:pPr algn="just"/>
+            <a:r>
+              <a:rPr lang="es-ES" sz="1600" b="1" dirty="0"/>
+              <a:t>Aislamiento:</a:t>
+            </a:r>
+            <a:r>
+              <a:rPr lang="es-ES" sz="1600" dirty="0"/>
+              <a:t> las máquinas virtuales son totalmente independientes</a:t>
+            </a:r>
+            <a:r>
+              <a:rPr lang="es-ES" sz="1600" dirty="0" smtClean="0"/>
+              <a:t>, entre </a:t>
+            </a:r>
+            <a:r>
+              <a:rPr lang="es-ES" sz="1600" dirty="0"/>
+              <a:t>sí y con el </a:t>
+            </a:r>
+            <a:r>
+              <a:rPr lang="es-ES" sz="1600" dirty="0" err="1"/>
+              <a:t>hypervisor</a:t>
+            </a:r>
+            <a:r>
+              <a:rPr lang="es-ES" sz="1600" dirty="0" smtClean="0"/>
+              <a:t>.</a:t>
+            </a:r>
+          </a:p>
+          <a:p>
+            <a:pPr algn="just"/>
+            <a:r>
+              <a:rPr lang="es-ES" sz="1600" b="1" dirty="0" smtClean="0"/>
+              <a:t>Portabilidad </a:t>
+            </a:r>
+            <a:r>
+              <a:rPr lang="es-ES" sz="1600" dirty="0" smtClean="0"/>
+              <a:t>y </a:t>
+            </a:r>
+            <a:r>
+              <a:rPr lang="es-ES" sz="1600" b="1" dirty="0" smtClean="0"/>
+              <a:t>recuperación:</a:t>
+            </a:r>
+            <a:r>
+              <a:rPr lang="es-ES" sz="1600" dirty="0"/>
+              <a:t> </a:t>
+            </a:r>
+            <a:r>
+              <a:rPr lang="es-ES" sz="1600" dirty="0" smtClean="0"/>
+              <a:t>gracias a las </a:t>
+            </a:r>
+            <a:r>
+              <a:rPr lang="es-ES" sz="1600" dirty="0" err="1" smtClean="0"/>
+              <a:t>snapshots</a:t>
+            </a:r>
+            <a:r>
+              <a:rPr lang="es-ES" sz="1600" dirty="0" smtClean="0"/>
+              <a:t>.</a:t>
+            </a:r>
+          </a:p>
+          <a:p>
+            <a:pPr algn="just"/>
+            <a:r>
+              <a:rPr lang="es-ES" sz="1600" b="1" dirty="0" smtClean="0"/>
+              <a:t>Flexibilidad: </a:t>
+            </a:r>
+            <a:r>
+              <a:rPr lang="es-ES" sz="1600" dirty="0"/>
+              <a:t>podemos crear las máquinas virtuales con las características de CPU, memoria, disco y red que </a:t>
+            </a:r>
+            <a:r>
+              <a:rPr lang="es-ES" sz="1600" dirty="0" smtClean="0"/>
+              <a:t>necesitemos.</a:t>
+            </a:r>
+            <a:endParaRPr lang="es-ES" sz="1600" b="1" dirty="0" smtClean="0"/>
+          </a:p>
+          <a:p>
+            <a:pPr algn="just"/>
+            <a:r>
+              <a:rPr lang="es-ES" sz="1600" b="1" dirty="0" smtClean="0"/>
+              <a:t>Agilidad: </a:t>
+            </a:r>
+            <a:r>
+              <a:rPr lang="es-ES" sz="1600" dirty="0"/>
+              <a:t>la creación de una máquina virtual es un proceso muy </a:t>
+            </a:r>
+            <a:r>
+              <a:rPr lang="es-ES" sz="1600" dirty="0" smtClean="0"/>
+              <a:t>rápido.</a:t>
+            </a:r>
+          </a:p>
+          <a:p>
+            <a:pPr algn="just"/>
+            <a:r>
+              <a:rPr lang="es-ES" sz="1600" b="1" dirty="0" smtClean="0"/>
+              <a:t>Reducción de costes:</a:t>
+            </a:r>
+            <a:r>
+              <a:rPr lang="es-ES" sz="1600" dirty="0" smtClean="0"/>
+              <a:t> hardware, mantenimiento, energía, …</a:t>
+            </a:r>
+            <a:endParaRPr lang="es-ES" sz="1600" b="1" dirty="0" smtClean="0"/>
+          </a:p>
+          <a:p>
+            <a:pPr algn="just"/>
+            <a:r>
+              <a:rPr lang="es-ES" sz="1600" b="1" dirty="0" smtClean="0"/>
+              <a:t>Eficiencia: </a:t>
+            </a:r>
+            <a:r>
+              <a:rPr lang="es-ES" sz="1600" dirty="0" smtClean="0"/>
+              <a:t>reduciendo el tiempo de inactividad de los servidores.</a:t>
+            </a:r>
+          </a:p>
+          <a:p>
+            <a:pPr algn="just"/>
+            <a:r>
+              <a:rPr lang="es-ES" sz="1600" b="1" dirty="0" smtClean="0"/>
+              <a:t>Administración más sencilla.</a:t>
+            </a:r>
+            <a:endParaRPr lang="es-ES" sz="1600" b="1" dirty="0"/>
+          </a:p>
+        </p:txBody>
+      </p:sp>
+      <p:sp>
+        <p:nvSpPr>
+          <p:cNvPr id="7" name="6 Marcador de texto"/>
+          <p:cNvSpPr>
+            <a:spLocks noGrp="1"/>
+          </p:cNvSpPr>
+          <p:nvPr>
+            <p:ph type="body" sz="quarter" idx="3"/>
+          </p:nvPr>
+        </p:nvSpPr>
+        <p:spPr>
+          <a:xfrm>
+            <a:off x="4644008" y="332656"/>
+            <a:ext cx="4041775" cy="639762"/>
+          </a:xfrm>
+        </p:spPr>
+        <p:txBody>
+          <a:bodyPr/>
+          <a:lstStyle/>
+          <a:p>
+            <a:pPr algn="ctr"/>
+            <a:r>
+              <a:rPr lang="es-ES" dirty="0" smtClean="0"/>
+              <a:t>Inconvenientes</a:t>
+            </a:r>
+            <a:endParaRPr lang="es-ES" dirty="0"/>
+          </a:p>
+        </p:txBody>
+      </p:sp>
+      <p:sp>
+        <p:nvSpPr>
+          <p:cNvPr id="8" name="7 Marcador de contenido"/>
+          <p:cNvSpPr>
+            <a:spLocks noGrp="1"/>
+          </p:cNvSpPr>
+          <p:nvPr>
+            <p:ph sz="quarter" idx="4"/>
+          </p:nvPr>
+        </p:nvSpPr>
+        <p:spPr>
+          <a:xfrm>
+            <a:off x="4645025" y="1124744"/>
+            <a:ext cx="4041775" cy="5001419"/>
+          </a:xfrm>
+        </p:spPr>
+        <p:txBody>
+          <a:bodyPr>
+            <a:normAutofit/>
+          </a:bodyPr>
+          <a:lstStyle/>
+          <a:p>
+            <a:pPr algn="just"/>
+            <a:r>
+              <a:rPr lang="es-ES" sz="1600" b="1" dirty="0" smtClean="0"/>
+              <a:t>Aumento de los costos iniciales: </a:t>
+            </a:r>
+            <a:r>
+              <a:rPr lang="es-ES" sz="1600" dirty="0" smtClean="0"/>
+              <a:t>software, estudios previos, …</a:t>
+            </a:r>
+          </a:p>
+          <a:p>
+            <a:pPr algn="just"/>
+            <a:r>
+              <a:rPr lang="es-ES" sz="1600" b="1" dirty="0" smtClean="0"/>
+              <a:t>Entorno virtual:</a:t>
+            </a:r>
+            <a:r>
+              <a:rPr lang="es-ES" sz="1600" dirty="0" smtClean="0"/>
+              <a:t> necesidad de aprender a manejarlo. Nuevas herramientas.</a:t>
+            </a:r>
+          </a:p>
+          <a:p>
+            <a:pPr algn="just"/>
+            <a:r>
+              <a:rPr lang="es-ES" sz="1600" b="1" dirty="0" smtClean="0"/>
+              <a:t>Menor rendimiento:</a:t>
+            </a:r>
+            <a:r>
+              <a:rPr lang="es-ES" sz="1600" dirty="0" smtClean="0"/>
+              <a:t> Debido a que las máquinas no corren directamente sobre el hardware.</a:t>
+            </a:r>
+          </a:p>
+          <a:p>
+            <a:pPr algn="just"/>
+            <a:r>
+              <a:rPr lang="es-ES" sz="1600" b="1" dirty="0" err="1" smtClean="0"/>
+              <a:t>Saturamiento</a:t>
+            </a:r>
+            <a:r>
+              <a:rPr lang="es-ES" sz="1600" b="1" dirty="0" smtClean="0"/>
+              <a:t>:</a:t>
+            </a:r>
+            <a:r>
+              <a:rPr lang="es-ES" sz="1600" dirty="0" smtClean="0"/>
+              <a:t> Un elevado número de VM puede llegar a saturar un servidor.</a:t>
+            </a:r>
+          </a:p>
+          <a:p>
+            <a:pPr algn="just"/>
+            <a:r>
+              <a:rPr lang="es-ES" sz="1600" b="1" dirty="0" smtClean="0"/>
+              <a:t>Degradación: </a:t>
+            </a:r>
+            <a:r>
+              <a:rPr lang="es-ES" sz="1600" dirty="0" smtClean="0"/>
+              <a:t>en las máquinas virtuales y en el almacenamiento.</a:t>
+            </a:r>
+            <a:endParaRPr lang="es-ES" sz="1600" b="1" dirty="0"/>
           </a:p>
         </p:txBody>
       </p:sp>
     </p:spTree>
     <p:extLst>
       <p:ext uri="{BB962C8B-B14F-4D97-AF65-F5344CB8AC3E}">
-        <p14:creationId xmlns:p14="http://schemas.microsoft.com/office/powerpoint/2010/main" val="4015673802"/>
+        <p14:creationId xmlns:p14="http://schemas.microsoft.com/office/powerpoint/2010/main" val="307869657"/>
       </p:ext>
     </p:extLst>
   </p:cSld>
@@ -4035,46 +4304,322 @@
       </p:grpSpPr>
       <p:sp>
         <p:nvSpPr>
-          <p:cNvPr id="2" name="1 Título"/>
-          <p:cNvSpPr>
-            <a:spLocks noGrp="1"/>
-          </p:cNvSpPr>
-          <p:nvPr>
-            <p:ph type="ctrTitle"/>
-          </p:nvPr>
-        </p:nvSpPr>
-        <p:spPr/>
-        <p:txBody>
-          <a:bodyPr/>
-          <a:lstStyle/>
-          <a:p>
-            <a:endParaRPr lang="es-ES"/>
-          </a:p>
-        </p:txBody>
-      </p:sp>
-      <p:sp>
-        <p:nvSpPr>
-          <p:cNvPr id="3" name="2 Subtítulo"/>
-          <p:cNvSpPr>
-            <a:spLocks noGrp="1"/>
-          </p:cNvSpPr>
-          <p:nvPr>
-            <p:ph type="subTitle" idx="1"/>
-          </p:nvPr>
-        </p:nvSpPr>
-        <p:spPr/>
-        <p:txBody>
-          <a:bodyPr/>
-          <a:lstStyle/>
-          <a:p>
+          <p:cNvPr id="4" name="3 Título"/>
+          <p:cNvSpPr>
+            <a:spLocks noGrp="1"/>
+          </p:cNvSpPr>
+          <p:nvPr>
+            <p:ph type="title"/>
+          </p:nvPr>
+        </p:nvSpPr>
+        <p:spPr/>
+        <p:txBody>
+          <a:bodyPr/>
+          <a:lstStyle/>
+          <a:p>
+            <a:r>
+              <a:rPr lang="es-ES" dirty="0" smtClean="0"/>
+              <a:t>Algunos </a:t>
+            </a:r>
+            <a:r>
+              <a:rPr lang="es-ES" dirty="0" err="1" smtClean="0"/>
+              <a:t>hipervisores</a:t>
+            </a:r>
             <a:endParaRPr lang="es-ES" dirty="0"/>
           </a:p>
         </p:txBody>
       </p:sp>
+      <p:pic>
+        <p:nvPicPr>
+          <p:cNvPr id="1026" name="Picture 2" descr="C:\Users\Angel\Dropbox\Universidad\Tercero\Segundo Cuatri\SWAP\trabajo\ppt\Hyper-V-Blog-Cover_qrww7v.png"/>
+          <p:cNvPicPr>
+            <a:picLocks noChangeAspect="1" noChangeArrowheads="1"/>
+          </p:cNvPicPr>
+          <p:nvPr/>
+        </p:nvPicPr>
+        <p:blipFill>
+          <a:blip r:embed="rId2" cstate="print">
+            <a:extLst>
+              <a:ext uri="{28A0092B-C50C-407E-A947-70E740481C1C}">
+                <a14:useLocalDpi xmlns:a14="http://schemas.microsoft.com/office/drawing/2010/main" val="0"/>
+              </a:ext>
+            </a:extLst>
+          </a:blip>
+          <a:srcRect/>
+          <a:stretch>
+            <a:fillRect/>
+          </a:stretch>
+        </p:blipFill>
+        <p:spPr bwMode="auto">
+          <a:xfrm>
+            <a:off x="3901237" y="1383359"/>
+            <a:ext cx="5327394" cy="1183728"/>
+          </a:xfrm>
+          <a:prstGeom prst="rect">
+            <a:avLst/>
+          </a:prstGeom>
+          <a:noFill/>
+          <a:extLst>
+            <a:ext uri="{909E8E84-426E-40DD-AFC4-6F175D3DCCD1}">
+              <a14:hiddenFill xmlns:a14="http://schemas.microsoft.com/office/drawing/2010/main">
+                <a:solidFill>
+                  <a:srgbClr val="FFFFFF"/>
+                </a:solidFill>
+              </a14:hiddenFill>
+            </a:ext>
+          </a:extLst>
+        </p:spPr>
+      </p:pic>
+      <p:pic>
+        <p:nvPicPr>
+          <p:cNvPr id="1028" name="Picture 4" descr="C:\Users\Angel\Dropbox\Universidad\Tercero\Segundo Cuatri\SWAP\trabajo\ppt\vmware-esxi_original_original.png"/>
+          <p:cNvPicPr>
+            <a:picLocks noChangeAspect="1" noChangeArrowheads="1"/>
+          </p:cNvPicPr>
+          <p:nvPr/>
+        </p:nvPicPr>
+        <p:blipFill>
+          <a:blip r:embed="rId3" cstate="print">
+            <a:extLst>
+              <a:ext uri="{28A0092B-C50C-407E-A947-70E740481C1C}">
+                <a14:useLocalDpi xmlns:a14="http://schemas.microsoft.com/office/drawing/2010/main" val="0"/>
+              </a:ext>
+            </a:extLst>
+          </a:blip>
+          <a:srcRect/>
+          <a:stretch>
+            <a:fillRect/>
+          </a:stretch>
+        </p:blipFill>
+        <p:spPr bwMode="auto">
+          <a:xfrm>
+            <a:off x="4211960" y="5254676"/>
+            <a:ext cx="3312634" cy="970432"/>
+          </a:xfrm>
+          <a:prstGeom prst="rect">
+            <a:avLst/>
+          </a:prstGeom>
+          <a:noFill/>
+          <a:extLst>
+            <a:ext uri="{909E8E84-426E-40DD-AFC4-6F175D3DCCD1}">
+              <a14:hiddenFill xmlns:a14="http://schemas.microsoft.com/office/drawing/2010/main">
+                <a:solidFill>
+                  <a:srgbClr val="FFFFFF"/>
+                </a:solidFill>
+              </a14:hiddenFill>
+            </a:ext>
+          </a:extLst>
+        </p:spPr>
+      </p:pic>
+      <p:pic>
+        <p:nvPicPr>
+          <p:cNvPr id="1029" name="Picture 5" descr="C:\Users\Angel\Dropbox\Universidad\Tercero\Segundo Cuatri\SWAP\trabajo\ppt\Virtualbox_logo.png"/>
+          <p:cNvPicPr>
+            <a:picLocks noChangeAspect="1" noChangeArrowheads="1"/>
+          </p:cNvPicPr>
+          <p:nvPr/>
+        </p:nvPicPr>
+        <p:blipFill>
+          <a:blip r:embed="rId4">
+            <a:extLst>
+              <a:ext uri="{28A0092B-C50C-407E-A947-70E740481C1C}">
+                <a14:useLocalDpi xmlns:a14="http://schemas.microsoft.com/office/drawing/2010/main" val="0"/>
+              </a:ext>
+            </a:extLst>
+          </a:blip>
+          <a:srcRect/>
+          <a:stretch>
+            <a:fillRect/>
+          </a:stretch>
+        </p:blipFill>
+        <p:spPr bwMode="auto">
+          <a:xfrm>
+            <a:off x="7092280" y="2583671"/>
+            <a:ext cx="1757561" cy="1757561"/>
+          </a:xfrm>
+          <a:prstGeom prst="rect">
+            <a:avLst/>
+          </a:prstGeom>
+          <a:noFill/>
+          <a:extLst>
+            <a:ext uri="{909E8E84-426E-40DD-AFC4-6F175D3DCCD1}">
+              <a14:hiddenFill xmlns:a14="http://schemas.microsoft.com/office/drawing/2010/main">
+                <a:solidFill>
+                  <a:srgbClr val="FFFFFF"/>
+                </a:solidFill>
+              </a14:hiddenFill>
+            </a:ext>
+          </a:extLst>
+        </p:spPr>
+      </p:pic>
+      <p:pic>
+        <p:nvPicPr>
+          <p:cNvPr id="1030" name="Picture 6" descr="C:\Users\Angel\Dropbox\Universidad\Tercero\Segundo Cuatri\SWAP\trabajo\ppt\proxmox.png"/>
+          <p:cNvPicPr>
+            <a:picLocks noChangeAspect="1" noChangeArrowheads="1"/>
+          </p:cNvPicPr>
+          <p:nvPr/>
+        </p:nvPicPr>
+        <p:blipFill>
+          <a:blip r:embed="rId5" cstate="print">
+            <a:extLst>
+              <a:ext uri="{28A0092B-C50C-407E-A947-70E740481C1C}">
+                <a14:useLocalDpi xmlns:a14="http://schemas.microsoft.com/office/drawing/2010/main" val="0"/>
+              </a:ext>
+            </a:extLst>
+          </a:blip>
+          <a:srcRect/>
+          <a:stretch>
+            <a:fillRect/>
+          </a:stretch>
+        </p:blipFill>
+        <p:spPr bwMode="auto">
+          <a:xfrm>
+            <a:off x="1259632" y="4509120"/>
+            <a:ext cx="1880061" cy="1880061"/>
+          </a:xfrm>
+          <a:prstGeom prst="rect">
+            <a:avLst/>
+          </a:prstGeom>
+          <a:noFill/>
+          <a:extLst>
+            <a:ext uri="{909E8E84-426E-40DD-AFC4-6F175D3DCCD1}">
+              <a14:hiddenFill xmlns:a14="http://schemas.microsoft.com/office/drawing/2010/main">
+                <a:solidFill>
+                  <a:srgbClr val="FFFFFF"/>
+                </a:solidFill>
+              </a14:hiddenFill>
+            </a:ext>
+          </a:extLst>
+        </p:spPr>
+      </p:pic>
+      <p:pic>
+        <p:nvPicPr>
+          <p:cNvPr id="1031" name="Picture 7" descr="C:\Users\Angel\Dropbox\Universidad\Tercero\Segundo Cuatri\SWAP\trabajo\ppt\kvm-logo-square.png"/>
+          <p:cNvPicPr>
+            <a:picLocks noChangeAspect="1" noChangeArrowheads="1"/>
+          </p:cNvPicPr>
+          <p:nvPr/>
+        </p:nvPicPr>
+        <p:blipFill>
+          <a:blip r:embed="rId6" cstate="print">
+            <a:extLst>
+              <a:ext uri="{28A0092B-C50C-407E-A947-70E740481C1C}">
+                <a14:useLocalDpi xmlns:a14="http://schemas.microsoft.com/office/drawing/2010/main" val="0"/>
+              </a:ext>
+            </a:extLst>
+          </a:blip>
+          <a:srcRect/>
+          <a:stretch>
+            <a:fillRect/>
+          </a:stretch>
+        </p:blipFill>
+        <p:spPr bwMode="auto">
+          <a:xfrm>
+            <a:off x="971600" y="3033315"/>
+            <a:ext cx="1524000" cy="1308100"/>
+          </a:xfrm>
+          <a:prstGeom prst="rect">
+            <a:avLst/>
+          </a:prstGeom>
+          <a:noFill/>
+          <a:extLst>
+            <a:ext uri="{909E8E84-426E-40DD-AFC4-6F175D3DCCD1}">
+              <a14:hiddenFill xmlns:a14="http://schemas.microsoft.com/office/drawing/2010/main">
+                <a:solidFill>
+                  <a:srgbClr val="FFFFFF"/>
+                </a:solidFill>
+              </a14:hiddenFill>
+            </a:ext>
+          </a:extLst>
+        </p:spPr>
+      </p:pic>
+      <p:pic>
+        <p:nvPicPr>
+          <p:cNvPr id="1032" name="Picture 8" descr="C:\Users\Angel\Dropbox\Universidad\Tercero\Segundo Cuatri\SWAP\trabajo\ppt\logo-xenserver.png"/>
+          <p:cNvPicPr>
+            <a:picLocks noChangeAspect="1" noChangeArrowheads="1"/>
+          </p:cNvPicPr>
+          <p:nvPr/>
+        </p:nvPicPr>
+        <p:blipFill>
+          <a:blip r:embed="rId7" cstate="print">
+            <a:extLst>
+              <a:ext uri="{28A0092B-C50C-407E-A947-70E740481C1C}">
+                <a14:useLocalDpi xmlns:a14="http://schemas.microsoft.com/office/drawing/2010/main" val="0"/>
+              </a:ext>
+            </a:extLst>
+          </a:blip>
+          <a:srcRect/>
+          <a:stretch>
+            <a:fillRect/>
+          </a:stretch>
+        </p:blipFill>
+        <p:spPr bwMode="auto">
+          <a:xfrm>
+            <a:off x="740013" y="1462040"/>
+            <a:ext cx="3136876" cy="1192013"/>
+          </a:xfrm>
+          <a:prstGeom prst="rect">
+            <a:avLst/>
+          </a:prstGeom>
+          <a:noFill/>
+          <a:extLst>
+            <a:ext uri="{909E8E84-426E-40DD-AFC4-6F175D3DCCD1}">
+              <a14:hiddenFill xmlns:a14="http://schemas.microsoft.com/office/drawing/2010/main">
+                <a:solidFill>
+                  <a:srgbClr val="FFFFFF"/>
+                </a:solidFill>
+              </a14:hiddenFill>
+            </a:ext>
+          </a:extLst>
+        </p:spPr>
+      </p:pic>
+      <p:pic>
+        <p:nvPicPr>
+          <p:cNvPr id="1033" name="Picture 9" descr="C:\Users\Angel\Dropbox\Universidad\Tercero\Segundo Cuatri\SWAP\trabajo\ppt\Qemu_logo.svg.png"/>
+          <p:cNvPicPr>
+            <a:picLocks noChangeAspect="1" noChangeArrowheads="1"/>
+          </p:cNvPicPr>
+          <p:nvPr/>
+        </p:nvPicPr>
+        <p:blipFill>
+          <a:blip r:embed="rId8" cstate="print">
+            <a:extLst>
+              <a:ext uri="{28A0092B-C50C-407E-A947-70E740481C1C}">
+                <a14:useLocalDpi xmlns:a14="http://schemas.microsoft.com/office/drawing/2010/main" val="0"/>
+              </a:ext>
+            </a:extLst>
+          </a:blip>
+          <a:srcRect/>
+          <a:stretch>
+            <a:fillRect/>
+          </a:stretch>
+        </p:blipFill>
+        <p:spPr bwMode="auto">
+          <a:xfrm>
+            <a:off x="3676428" y="3212975"/>
+            <a:ext cx="2983583" cy="948779"/>
+          </a:xfrm>
+          <a:prstGeom prst="rect">
+            <a:avLst/>
+          </a:prstGeom>
+          <a:noFill/>
+          <a:extLst>
+            <a:ext uri="{909E8E84-426E-40DD-AFC4-6F175D3DCCD1}">
+              <a14:hiddenFill xmlns:a14="http://schemas.microsoft.com/office/drawing/2010/main">
+                <a:solidFill>
+                  <a:srgbClr val="FFFFFF"/>
+                </a:solidFill>
+              </a14:hiddenFill>
+            </a:ext>
+          </a:extLst>
+        </p:spPr>
+      </p:pic>
     </p:spTree>
     <p:extLst>
       <p:ext uri="{BB962C8B-B14F-4D97-AF65-F5344CB8AC3E}">
-        <p14:creationId xmlns:p14="http://schemas.microsoft.com/office/powerpoint/2010/main" val="307869657"/>
+        <p14:creationId xmlns:p14="http://schemas.microsoft.com/office/powerpoint/2010/main" val="4015673802"/>
       </p:ext>
     </p:extLst>
   </p:cSld>

</xml_diff>